<commit_message>
update topics and readme
</commit_message>
<xml_diff>
--- a/06.operadores_variables_constantes_tipos de datos.pptx
+++ b/06.operadores_variables_constantes_tipos de datos.pptx
@@ -306,14 +306,6 @@
 </p:presentation>
 </file>
 
-<file path=ppt/revisionInfo.xml><?xml version="1.0" encoding="utf-8"?>
-<p1510:revInfo xmlns:a="http://schemas.openxmlformats.org/drawingml/2006/main" xmlns:r="http://schemas.openxmlformats.org/officeDocument/2006/relationships" xmlns:p1510="http://schemas.microsoft.com/office/powerpoint/2015/10/main">
-  <p1510:revLst>
-    <p1510:client id="{C8DC1206-9CD7-4446-A3EE-A3A31CF70BA3}" v="17" dt="2023-08-30T17:35:53.913"/>
-  </p1510:revLst>
-</p1510:revInfo>
-</file>
-
 <file path=ppt/changesInfos/changesInfo1.xml><?xml version="1.0" encoding="utf-8"?>
 <pc:chgInfo xmlns:a="http://schemas.openxmlformats.org/drawingml/2006/main" xmlns:r="http://schemas.openxmlformats.org/officeDocument/2006/relationships" xmlns:ac="http://schemas.microsoft.com/office/drawing/2013/main/command" xmlns:pc="http://schemas.microsoft.com/office/powerpoint/2013/main/command">
   <pc:docChgLst>
@@ -4178,6 +4170,22 @@
           </pc:sldLayoutMkLst>
         </pc:sldLayoutChg>
       </pc:sldMasterChg>
+    </pc:docChg>
+  </pc:docChgLst>
+  <pc:docChgLst>
+    <pc:chgData name="NORBEY DANILO MUÑOZ CAÑON" userId="29f64d73-8b12-4c53-a9f3-1c223397a229" providerId="ADAL" clId="{830749CF-5C19-4ECB-A838-754A07EEF336}"/>
+    <pc:docChg chg="modSld">
+      <pc:chgData name="NORBEY DANILO MUÑOZ CAÑON" userId="29f64d73-8b12-4c53-a9f3-1c223397a229" providerId="ADAL" clId="{830749CF-5C19-4ECB-A838-754A07EEF336}" dt="2023-09-06T03:11:44.358" v="67" actId="20577"/>
+      <pc:docMkLst>
+        <pc:docMk/>
+      </pc:docMkLst>
+      <pc:sldChg chg="modNotesTx">
+        <pc:chgData name="NORBEY DANILO MUÑOZ CAÑON" userId="29f64d73-8b12-4c53-a9f3-1c223397a229" providerId="ADAL" clId="{830749CF-5C19-4ECB-A838-754A07EEF336}" dt="2023-09-06T03:11:44.358" v="67" actId="20577"/>
+        <pc:sldMkLst>
+          <pc:docMk/>
+          <pc:sldMk cId="4041968668" sldId="408"/>
+        </pc:sldMkLst>
+      </pc:sldChg>
     </pc:docChg>
   </pc:docChgLst>
   <pc:docChgLst>
@@ -11498,7 +11506,31 @@
               </a:spcAft>
               <a:buNone/>
             </a:pPr>
-            <a:endParaRPr/>
+            <a:r>
+              <a:rPr lang="en-US" dirty="0"/>
+              <a:t>=== </a:t>
+            </a:r>
+            <a:r>
+              <a:rPr lang="en-US" dirty="0" err="1"/>
+              <a:t>Comparación</a:t>
+            </a:r>
+            <a:r>
+              <a:rPr lang="en-US" dirty="0"/>
+              <a:t> </a:t>
+            </a:r>
+            <a:r>
+              <a:rPr lang="en-US" dirty="0" err="1"/>
+              <a:t>estricta</a:t>
+            </a:r>
+            <a:r>
+              <a:rPr lang="en-US" dirty="0"/>
+              <a:t>. Tipo </a:t>
+            </a:r>
+            <a:r>
+              <a:rPr lang="en-US"/>
+              <a:t>y valor.</a:t>
+            </a:r>
+            <a:endParaRPr dirty="0"/>
           </a:p>
         </p:txBody>
       </p:sp>

</xml_diff>